<commit_message>
updated report and pp
</commit_message>
<xml_diff>
--- a/TexasDistrictForecast.pptx
+++ b/TexasDistrictForecast.pptx
@@ -10,10 +10,14 @@
     <p:sldId id="259" r:id="rId4"/>
     <p:sldId id="260" r:id="rId5"/>
     <p:sldId id="273" r:id="rId6"/>
-    <p:sldId id="274" r:id="rId7"/>
-    <p:sldId id="276" r:id="rId8"/>
-    <p:sldId id="275" r:id="rId9"/>
-    <p:sldId id="262" r:id="rId10"/>
+    <p:sldId id="276" r:id="rId7"/>
+    <p:sldId id="275" r:id="rId8"/>
+    <p:sldId id="262" r:id="rId9"/>
+    <p:sldId id="277" r:id="rId10"/>
+    <p:sldId id="278" r:id="rId11"/>
+    <p:sldId id="279" r:id="rId12"/>
+    <p:sldId id="280" r:id="rId13"/>
+    <p:sldId id="281" r:id="rId14"/>
   </p:sldIdLst>
   <p:sldSz cx="12192000" cy="6858000"/>
   <p:notesSz cx="6858000" cy="9144000"/>
@@ -112,6 +116,11 @@
       </a:defRPr>
     </a:lvl9pPr>
   </p:defaultTextStyle>
+  <p:extLst>
+    <p:ext uri="{EFAFB233-063F-42B5-8137-9DF3F51BA10A}">
+      <p15:sldGuideLst xmlns:p15="http://schemas.microsoft.com/office/powerpoint/2012/main"/>
+    </p:ext>
+  </p:extLst>
 </p:presentation>
 </file>
 
@@ -262,7 +271,7 @@
           <a:p>
             <a:fld id="{D8A0F69C-4D49-4D49-989B-4887897EB134}" type="datetimeFigureOut">
               <a:rPr lang="en-US" smtClean="0"/>
-              <a:t>3/1/2020</a:t>
+              <a:t>3/18/2020</a:t>
             </a:fld>
             <a:endParaRPr lang="en-US"/>
           </a:p>
@@ -460,7 +469,7 @@
           <a:p>
             <a:fld id="{D8A0F69C-4D49-4D49-989B-4887897EB134}" type="datetimeFigureOut">
               <a:rPr lang="en-US" smtClean="0"/>
-              <a:t>3/1/2020</a:t>
+              <a:t>3/18/2020</a:t>
             </a:fld>
             <a:endParaRPr lang="en-US"/>
           </a:p>
@@ -668,7 +677,7 @@
           <a:p>
             <a:fld id="{D8A0F69C-4D49-4D49-989B-4887897EB134}" type="datetimeFigureOut">
               <a:rPr lang="en-US" smtClean="0"/>
-              <a:t>3/1/2020</a:t>
+              <a:t>3/18/2020</a:t>
             </a:fld>
             <a:endParaRPr lang="en-US"/>
           </a:p>
@@ -866,7 +875,7 @@
           <a:p>
             <a:fld id="{D8A0F69C-4D49-4D49-989B-4887897EB134}" type="datetimeFigureOut">
               <a:rPr lang="en-US" smtClean="0"/>
-              <a:t>3/1/2020</a:t>
+              <a:t>3/18/2020</a:t>
             </a:fld>
             <a:endParaRPr lang="en-US"/>
           </a:p>
@@ -1141,7 +1150,7 @@
           <a:p>
             <a:fld id="{D8A0F69C-4D49-4D49-989B-4887897EB134}" type="datetimeFigureOut">
               <a:rPr lang="en-US" smtClean="0"/>
-              <a:t>3/1/2020</a:t>
+              <a:t>3/18/2020</a:t>
             </a:fld>
             <a:endParaRPr lang="en-US"/>
           </a:p>
@@ -1406,7 +1415,7 @@
           <a:p>
             <a:fld id="{D8A0F69C-4D49-4D49-989B-4887897EB134}" type="datetimeFigureOut">
               <a:rPr lang="en-US" smtClean="0"/>
-              <a:t>3/1/2020</a:t>
+              <a:t>3/18/2020</a:t>
             </a:fld>
             <a:endParaRPr lang="en-US"/>
           </a:p>
@@ -1818,7 +1827,7 @@
           <a:p>
             <a:fld id="{D8A0F69C-4D49-4D49-989B-4887897EB134}" type="datetimeFigureOut">
               <a:rPr lang="en-US" smtClean="0"/>
-              <a:t>3/1/2020</a:t>
+              <a:t>3/18/2020</a:t>
             </a:fld>
             <a:endParaRPr lang="en-US"/>
           </a:p>
@@ -1959,7 +1968,7 @@
           <a:p>
             <a:fld id="{D8A0F69C-4D49-4D49-989B-4887897EB134}" type="datetimeFigureOut">
               <a:rPr lang="en-US" smtClean="0"/>
-              <a:t>3/1/2020</a:t>
+              <a:t>3/18/2020</a:t>
             </a:fld>
             <a:endParaRPr lang="en-US"/>
           </a:p>
@@ -2072,7 +2081,7 @@
           <a:p>
             <a:fld id="{D8A0F69C-4D49-4D49-989B-4887897EB134}" type="datetimeFigureOut">
               <a:rPr lang="en-US" smtClean="0"/>
-              <a:t>3/1/2020</a:t>
+              <a:t>3/18/2020</a:t>
             </a:fld>
             <a:endParaRPr lang="en-US"/>
           </a:p>
@@ -2383,7 +2392,7 @@
           <a:p>
             <a:fld id="{D8A0F69C-4D49-4D49-989B-4887897EB134}" type="datetimeFigureOut">
               <a:rPr lang="en-US" smtClean="0"/>
-              <a:t>3/1/2020</a:t>
+              <a:t>3/18/2020</a:t>
             </a:fld>
             <a:endParaRPr lang="en-US"/>
           </a:p>
@@ -2671,7 +2680,7 @@
           <a:p>
             <a:fld id="{D8A0F69C-4D49-4D49-989B-4887897EB134}" type="datetimeFigureOut">
               <a:rPr lang="en-US" smtClean="0"/>
-              <a:t>3/1/2020</a:t>
+              <a:t>3/18/2020</a:t>
             </a:fld>
             <a:endParaRPr lang="en-US"/>
           </a:p>
@@ -2912,7 +2921,7 @@
           <a:p>
             <a:fld id="{D8A0F69C-4D49-4D49-989B-4887897EB134}" type="datetimeFigureOut">
               <a:rPr lang="en-US" smtClean="0"/>
-              <a:t>3/1/2020</a:t>
+              <a:t>3/18/2020</a:t>
             </a:fld>
             <a:endParaRPr lang="en-US"/>
           </a:p>
@@ -3347,7 +3356,7 @@
         </p:nvSpPr>
         <p:spPr>
           <a:xfrm>
-            <a:off x="500060" y="1342774"/>
+            <a:off x="500059" y="2722395"/>
             <a:ext cx="11191875" cy="2876300"/>
           </a:xfrm>
         </p:spPr>
@@ -3359,15 +3368,19 @@
           <a:p>
             <a:r>
               <a:rPr lang="en-US" sz="7200" b="1" dirty="0"/>
-              <a:t>Texas School District Analysis:</a:t>
+              <a:t>Texas Education:</a:t>
             </a:r>
             <a:br>
               <a:rPr lang="en-US" sz="7200" b="1" dirty="0"/>
             </a:br>
             <a:r>
-              <a:rPr lang="en-US" sz="7200" i="1" dirty="0"/>
-              <a:t>Classifying Districts on Their Ability to Prepare Students for College</a:t>
-            </a:r>
+              <a:rPr lang="en-US" i="1" dirty="0"/>
+              <a:t>(Predicting Percentage of Students Who Will Graduate College Within 4-Years, Based on the Features of the School District They Attended High School in)</a:t>
+            </a:r>
+            <a:br>
+              <a:rPr lang="en-US" dirty="0"/>
+            </a:br>
+            <a:endParaRPr lang="en-US" sz="7200" i="1" dirty="0"/>
           </a:p>
         </p:txBody>
       </p:sp>
@@ -3389,7 +3402,7 @@
         </p:nvSpPr>
         <p:spPr>
           <a:xfrm>
-            <a:off x="1523997" y="4484354"/>
+            <a:off x="1523996" y="4770814"/>
             <a:ext cx="9144000" cy="1655762"/>
           </a:xfrm>
         </p:spPr>
@@ -3401,7 +3414,7 @@
           </a:p>
           <a:p>
             <a:r>
-              <a:rPr lang="en-US" sz="4800" dirty="0"/>
+              <a:rPr lang="en-US" sz="5400" dirty="0"/>
               <a:t>Capstone 1 Project </a:t>
             </a:r>
           </a:p>
@@ -3411,6 +3424,726 @@
     <p:extLst>
       <p:ext uri="{BB962C8B-B14F-4D97-AF65-F5344CB8AC3E}">
         <p14:creationId xmlns:p14="http://schemas.microsoft.com/office/powerpoint/2010/main" val="2783812058"/>
+      </p:ext>
+    </p:extLst>
+  </p:cSld>
+  <p:clrMapOvr>
+    <a:masterClrMapping/>
+  </p:clrMapOvr>
+</p:sld>
+</file>
+
+<file path=ppt/slides/slide10.xml><?xml version="1.0" encoding="utf-8"?>
+<p:sld xmlns:a="http://schemas.openxmlformats.org/drawingml/2006/main" xmlns:r="http://schemas.openxmlformats.org/officeDocument/2006/relationships" xmlns:p="http://schemas.openxmlformats.org/presentationml/2006/main">
+  <p:cSld>
+    <p:spTree>
+      <p:nvGrpSpPr>
+        <p:cNvPr id="1" name=""/>
+        <p:cNvGrpSpPr/>
+        <p:nvPr/>
+      </p:nvGrpSpPr>
+      <p:grpSpPr>
+        <a:xfrm>
+          <a:off x="0" y="0"/>
+          <a:ext cx="0" cy="0"/>
+          <a:chOff x="0" y="0"/>
+          <a:chExt cx="0" cy="0"/>
+        </a:xfrm>
+      </p:grpSpPr>
+      <p:sp>
+        <p:nvSpPr>
+          <p:cNvPr id="2" name="Title 1">
+            <a:extLst>
+              <a:ext uri="{FF2B5EF4-FFF2-40B4-BE49-F238E27FC236}">
+                <a16:creationId xmlns:a16="http://schemas.microsoft.com/office/drawing/2014/main" id="{7EABDBA1-D72D-48C8-AED4-07A54FFEDEAC}"/>
+              </a:ext>
+            </a:extLst>
+          </p:cNvPr>
+          <p:cNvSpPr>
+            <a:spLocks noGrp="1"/>
+          </p:cNvSpPr>
+          <p:nvPr>
+            <p:ph type="title"/>
+          </p:nvPr>
+        </p:nvSpPr>
+        <p:spPr>
+          <a:xfrm>
+            <a:off x="838200" y="-144378"/>
+            <a:ext cx="10515600" cy="783850"/>
+          </a:xfrm>
+        </p:spPr>
+        <p:txBody>
+          <a:bodyPr>
+            <a:normAutofit/>
+          </a:bodyPr>
+          <a:lstStyle/>
+          <a:p>
+            <a:pPr algn="ctr"/>
+            <a:r>
+              <a:rPr lang="en-US" sz="2800" b="1" dirty="0"/>
+              <a:t>Data Analysis: (SAT/ACT Participation %)</a:t>
+            </a:r>
+          </a:p>
+        </p:txBody>
+      </p:sp>
+      <p:pic>
+        <p:nvPicPr>
+          <p:cNvPr id="4" name="Picture 3">
+            <a:extLst>
+              <a:ext uri="{FF2B5EF4-FFF2-40B4-BE49-F238E27FC236}">
+                <a16:creationId xmlns:a16="http://schemas.microsoft.com/office/drawing/2014/main" id="{46CBA4CD-D62F-4008-A0A2-B3DE2A3A19FF}"/>
+              </a:ext>
+            </a:extLst>
+          </p:cNvPr>
+          <p:cNvPicPr/>
+          <p:nvPr/>
+        </p:nvPicPr>
+        <p:blipFill>
+          <a:blip r:embed="rId2"/>
+          <a:stretch>
+            <a:fillRect/>
+          </a:stretch>
+        </p:blipFill>
+        <p:spPr>
+          <a:xfrm>
+            <a:off x="3701716" y="639472"/>
+            <a:ext cx="8490284" cy="1975392"/>
+          </a:xfrm>
+          <a:prstGeom prst="rect">
+            <a:avLst/>
+          </a:prstGeom>
+        </p:spPr>
+      </p:pic>
+      <p:pic>
+        <p:nvPicPr>
+          <p:cNvPr id="5" name="Picture 4">
+            <a:extLst>
+              <a:ext uri="{FF2B5EF4-FFF2-40B4-BE49-F238E27FC236}">
+                <a16:creationId xmlns:a16="http://schemas.microsoft.com/office/drawing/2014/main" id="{735353E9-320A-479C-8D66-5BFD10668512}"/>
+              </a:ext>
+            </a:extLst>
+          </p:cNvPr>
+          <p:cNvPicPr/>
+          <p:nvPr/>
+        </p:nvPicPr>
+        <p:blipFill>
+          <a:blip r:embed="rId3"/>
+          <a:stretch>
+            <a:fillRect/>
+          </a:stretch>
+        </p:blipFill>
+        <p:spPr>
+          <a:xfrm>
+            <a:off x="3701716" y="2614864"/>
+            <a:ext cx="8490284" cy="4243136"/>
+          </a:xfrm>
+          <a:prstGeom prst="rect">
+            <a:avLst/>
+          </a:prstGeom>
+        </p:spPr>
+      </p:pic>
+      <p:sp>
+        <p:nvSpPr>
+          <p:cNvPr id="6" name="TextBox 5">
+            <a:extLst>
+              <a:ext uri="{FF2B5EF4-FFF2-40B4-BE49-F238E27FC236}">
+                <a16:creationId xmlns:a16="http://schemas.microsoft.com/office/drawing/2014/main" id="{70728AB2-5B62-44A7-973A-832C0E112FC6}"/>
+              </a:ext>
+            </a:extLst>
+          </p:cNvPr>
+          <p:cNvSpPr txBox="1"/>
+          <p:nvPr/>
+        </p:nvSpPr>
+        <p:spPr>
+          <a:xfrm>
+            <a:off x="0" y="639472"/>
+            <a:ext cx="3701716" cy="6124754"/>
+          </a:xfrm>
+          <a:prstGeom prst="rect">
+            <a:avLst/>
+          </a:prstGeom>
+          <a:noFill/>
+        </p:spPr>
+        <p:txBody>
+          <a:bodyPr wrap="square" rtlCol="0">
+            <a:spAutoFit/>
+          </a:bodyPr>
+          <a:lstStyle/>
+          <a:p>
+            <a:pPr marL="285750" indent="-285750">
+              <a:buFont typeface="Arial" panose="020B0604020202020204" pitchFamily="34" charset="0"/>
+              <a:buChar char="•"/>
+            </a:pPr>
+            <a:r>
+              <a:rPr lang="en-US" sz="2800" dirty="0"/>
+              <a:t>It appears that the classes of 2011 – 2017 all appeared to favor taking the SAT. Why is this? </a:t>
+            </a:r>
+          </a:p>
+          <a:p>
+            <a:endParaRPr lang="en-US" sz="2800" dirty="0"/>
+          </a:p>
+          <a:p>
+            <a:pPr marL="285750" indent="-285750">
+              <a:buFont typeface="Arial" panose="020B0604020202020204" pitchFamily="34" charset="0"/>
+              <a:buChar char="•"/>
+            </a:pPr>
+            <a:r>
+              <a:rPr lang="en-US" sz="2800" dirty="0"/>
+              <a:t>It’s extremely curious that this trend exists when you consider that all it takes is doing well on one of the two tests to gain college admission and receive scholarship </a:t>
+            </a:r>
+          </a:p>
+        </p:txBody>
+      </p:sp>
+    </p:spTree>
+    <p:extLst>
+      <p:ext uri="{BB962C8B-B14F-4D97-AF65-F5344CB8AC3E}">
+        <p14:creationId xmlns:p14="http://schemas.microsoft.com/office/powerpoint/2010/main" val="694715857"/>
+      </p:ext>
+    </p:extLst>
+  </p:cSld>
+  <p:clrMapOvr>
+    <a:masterClrMapping/>
+  </p:clrMapOvr>
+</p:sld>
+</file>
+
+<file path=ppt/slides/slide11.xml><?xml version="1.0" encoding="utf-8"?>
+<p:sld xmlns:a="http://schemas.openxmlformats.org/drawingml/2006/main" xmlns:r="http://schemas.openxmlformats.org/officeDocument/2006/relationships" xmlns:p="http://schemas.openxmlformats.org/presentationml/2006/main">
+  <p:cSld>
+    <p:spTree>
+      <p:nvGrpSpPr>
+        <p:cNvPr id="1" name=""/>
+        <p:cNvGrpSpPr/>
+        <p:nvPr/>
+      </p:nvGrpSpPr>
+      <p:grpSpPr>
+        <a:xfrm>
+          <a:off x="0" y="0"/>
+          <a:ext cx="0" cy="0"/>
+          <a:chOff x="0" y="0"/>
+          <a:chExt cx="0" cy="0"/>
+        </a:xfrm>
+      </p:grpSpPr>
+      <p:pic>
+        <p:nvPicPr>
+          <p:cNvPr id="4" name="Picture 3">
+            <a:extLst>
+              <a:ext uri="{FF2B5EF4-FFF2-40B4-BE49-F238E27FC236}">
+                <a16:creationId xmlns:a16="http://schemas.microsoft.com/office/drawing/2014/main" id="{39F6469F-193D-4FD1-B6FF-59E7C47EF9DA}"/>
+              </a:ext>
+            </a:extLst>
+          </p:cNvPr>
+          <p:cNvPicPr/>
+          <p:nvPr/>
+        </p:nvPicPr>
+        <p:blipFill>
+          <a:blip r:embed="rId2"/>
+          <a:stretch>
+            <a:fillRect/>
+          </a:stretch>
+        </p:blipFill>
+        <p:spPr>
+          <a:xfrm>
+            <a:off x="128337" y="563050"/>
+            <a:ext cx="11935326" cy="3078909"/>
+          </a:xfrm>
+          <a:prstGeom prst="rect">
+            <a:avLst/>
+          </a:prstGeom>
+        </p:spPr>
+      </p:pic>
+      <p:pic>
+        <p:nvPicPr>
+          <p:cNvPr id="5" name="Picture 4">
+            <a:extLst>
+              <a:ext uri="{FF2B5EF4-FFF2-40B4-BE49-F238E27FC236}">
+                <a16:creationId xmlns:a16="http://schemas.microsoft.com/office/drawing/2014/main" id="{DE6682D8-ACA7-48A8-A7DA-4CD77EF7B5D5}"/>
+              </a:ext>
+            </a:extLst>
+          </p:cNvPr>
+          <p:cNvPicPr/>
+          <p:nvPr/>
+        </p:nvPicPr>
+        <p:blipFill>
+          <a:blip r:embed="rId3"/>
+          <a:stretch>
+            <a:fillRect/>
+          </a:stretch>
+        </p:blipFill>
+        <p:spPr>
+          <a:xfrm>
+            <a:off x="64168" y="3641959"/>
+            <a:ext cx="12063663" cy="3216041"/>
+          </a:xfrm>
+          <a:prstGeom prst="rect">
+            <a:avLst/>
+          </a:prstGeom>
+        </p:spPr>
+      </p:pic>
+      <p:sp>
+        <p:nvSpPr>
+          <p:cNvPr id="6" name="TextBox 5">
+            <a:extLst>
+              <a:ext uri="{FF2B5EF4-FFF2-40B4-BE49-F238E27FC236}">
+                <a16:creationId xmlns:a16="http://schemas.microsoft.com/office/drawing/2014/main" id="{4CDD32CD-7EF0-484C-999F-6DA85D02AFCE}"/>
+              </a:ext>
+            </a:extLst>
+          </p:cNvPr>
+          <p:cNvSpPr txBox="1"/>
+          <p:nvPr/>
+        </p:nvSpPr>
+        <p:spPr>
+          <a:xfrm>
+            <a:off x="2133599" y="101385"/>
+            <a:ext cx="7924800" cy="461665"/>
+          </a:xfrm>
+          <a:prstGeom prst="rect">
+            <a:avLst/>
+          </a:prstGeom>
+          <a:noFill/>
+        </p:spPr>
+        <p:txBody>
+          <a:bodyPr wrap="square" rtlCol="0">
+            <a:spAutoFit/>
+          </a:bodyPr>
+          <a:lstStyle/>
+          <a:p>
+            <a:pPr algn="ctr"/>
+            <a:r>
+              <a:rPr lang="en-US" sz="2400" dirty="0"/>
+              <a:t>Data Analysis: (AP- Passing % and Wealth/ADA ($)</a:t>
+            </a:r>
+          </a:p>
+        </p:txBody>
+      </p:sp>
+      <p:sp>
+        <p:nvSpPr>
+          <p:cNvPr id="7" name="TextBox 6">
+            <a:extLst>
+              <a:ext uri="{FF2B5EF4-FFF2-40B4-BE49-F238E27FC236}">
+                <a16:creationId xmlns:a16="http://schemas.microsoft.com/office/drawing/2014/main" id="{C3207DD6-00EC-4D24-B49B-F2FA25707117}"/>
+              </a:ext>
+            </a:extLst>
+          </p:cNvPr>
+          <p:cNvSpPr txBox="1"/>
+          <p:nvPr/>
+        </p:nvSpPr>
+        <p:spPr>
+          <a:xfrm>
+            <a:off x="7443537" y="786075"/>
+            <a:ext cx="1507958" cy="923330"/>
+          </a:xfrm>
+          <a:prstGeom prst="rect">
+            <a:avLst/>
+          </a:prstGeom>
+          <a:noFill/>
+        </p:spPr>
+        <p:txBody>
+          <a:bodyPr wrap="square" rtlCol="0">
+            <a:spAutoFit/>
+          </a:bodyPr>
+          <a:lstStyle/>
+          <a:p>
+            <a:pPr algn="ctr"/>
+            <a:r>
+              <a:rPr lang="en-US" dirty="0"/>
+              <a:t>District-Level Mean:</a:t>
+            </a:r>
+          </a:p>
+          <a:p>
+            <a:pPr algn="ctr"/>
+            <a:r>
+              <a:rPr lang="en-US" dirty="0"/>
+              <a:t>45.1%</a:t>
+            </a:r>
+          </a:p>
+        </p:txBody>
+      </p:sp>
+      <p:sp>
+        <p:nvSpPr>
+          <p:cNvPr id="8" name="TextBox 7">
+            <a:extLst>
+              <a:ext uri="{FF2B5EF4-FFF2-40B4-BE49-F238E27FC236}">
+                <a16:creationId xmlns:a16="http://schemas.microsoft.com/office/drawing/2014/main" id="{4D1A01FF-297D-45DE-8BAB-55A54CD08433}"/>
+              </a:ext>
+            </a:extLst>
+          </p:cNvPr>
+          <p:cNvSpPr txBox="1"/>
+          <p:nvPr/>
+        </p:nvSpPr>
+        <p:spPr>
+          <a:xfrm>
+            <a:off x="9785684" y="4311595"/>
+            <a:ext cx="1507958" cy="923330"/>
+          </a:xfrm>
+          <a:prstGeom prst="rect">
+            <a:avLst/>
+          </a:prstGeom>
+          <a:noFill/>
+        </p:spPr>
+        <p:txBody>
+          <a:bodyPr wrap="square" rtlCol="0">
+            <a:spAutoFit/>
+          </a:bodyPr>
+          <a:lstStyle/>
+          <a:p>
+            <a:pPr algn="ctr"/>
+            <a:r>
+              <a:rPr lang="en-US" dirty="0"/>
+              <a:t>District-Level Mean:</a:t>
+            </a:r>
+          </a:p>
+          <a:p>
+            <a:pPr algn="ctr"/>
+            <a:r>
+              <a:rPr lang="en-US" dirty="0"/>
+              <a:t>$431,718</a:t>
+            </a:r>
+          </a:p>
+        </p:txBody>
+      </p:sp>
+    </p:spTree>
+    <p:extLst>
+      <p:ext uri="{BB962C8B-B14F-4D97-AF65-F5344CB8AC3E}">
+        <p14:creationId xmlns:p14="http://schemas.microsoft.com/office/powerpoint/2010/main" val="1871328371"/>
+      </p:ext>
+    </p:extLst>
+  </p:cSld>
+  <p:clrMapOvr>
+    <a:masterClrMapping/>
+  </p:clrMapOvr>
+</p:sld>
+</file>
+
+<file path=ppt/slides/slide12.xml><?xml version="1.0" encoding="utf-8"?>
+<p:sld xmlns:a="http://schemas.openxmlformats.org/drawingml/2006/main" xmlns:r="http://schemas.openxmlformats.org/officeDocument/2006/relationships" xmlns:p="http://schemas.openxmlformats.org/presentationml/2006/main">
+  <p:cSld>
+    <p:spTree>
+      <p:nvGrpSpPr>
+        <p:cNvPr id="1" name=""/>
+        <p:cNvGrpSpPr/>
+        <p:nvPr/>
+      </p:nvGrpSpPr>
+      <p:grpSpPr>
+        <a:xfrm>
+          <a:off x="0" y="0"/>
+          <a:ext cx="0" cy="0"/>
+          <a:chOff x="0" y="0"/>
+          <a:chExt cx="0" cy="0"/>
+        </a:xfrm>
+      </p:grpSpPr>
+      <p:pic>
+        <p:nvPicPr>
+          <p:cNvPr id="4" name="Picture 3">
+            <a:extLst>
+              <a:ext uri="{FF2B5EF4-FFF2-40B4-BE49-F238E27FC236}">
+                <a16:creationId xmlns:a16="http://schemas.microsoft.com/office/drawing/2014/main" id="{15034811-80EE-4B40-8F6B-F81550509D73}"/>
+              </a:ext>
+            </a:extLst>
+          </p:cNvPr>
+          <p:cNvPicPr/>
+          <p:nvPr/>
+        </p:nvPicPr>
+        <p:blipFill>
+          <a:blip r:embed="rId2"/>
+          <a:stretch>
+            <a:fillRect/>
+          </a:stretch>
+        </p:blipFill>
+        <p:spPr>
+          <a:xfrm>
+            <a:off x="4443663" y="1432169"/>
+            <a:ext cx="7748337" cy="5281451"/>
+          </a:xfrm>
+          <a:prstGeom prst="rect">
+            <a:avLst/>
+          </a:prstGeom>
+        </p:spPr>
+      </p:pic>
+      <p:sp>
+        <p:nvSpPr>
+          <p:cNvPr id="6" name="TextBox 5">
+            <a:extLst>
+              <a:ext uri="{FF2B5EF4-FFF2-40B4-BE49-F238E27FC236}">
+                <a16:creationId xmlns:a16="http://schemas.microsoft.com/office/drawing/2014/main" id="{61917F3E-63FA-42DF-9480-3BE14488E124}"/>
+              </a:ext>
+            </a:extLst>
+          </p:cNvPr>
+          <p:cNvSpPr txBox="1"/>
+          <p:nvPr/>
+        </p:nvSpPr>
+        <p:spPr>
+          <a:xfrm>
+            <a:off x="1540042" y="144379"/>
+            <a:ext cx="8726905" cy="1200329"/>
+          </a:xfrm>
+          <a:prstGeom prst="rect">
+            <a:avLst/>
+          </a:prstGeom>
+          <a:noFill/>
+        </p:spPr>
+        <p:txBody>
+          <a:bodyPr wrap="square" rtlCol="0">
+            <a:spAutoFit/>
+          </a:bodyPr>
+          <a:lstStyle/>
+          <a:p>
+            <a:pPr algn="ctr"/>
+            <a:r>
+              <a:rPr lang="en-US" sz="2400" b="1" dirty="0"/>
+              <a:t>Data Analysis: (Wealth/ADA ($) Effect on College Enrollment Percentage and College Graduation Percentage) </a:t>
+            </a:r>
+          </a:p>
+          <a:p>
+            <a:pPr algn="ctr"/>
+            <a:r>
+              <a:rPr lang="en-US" sz="2400" b="1" dirty="0"/>
+              <a:t>PART 1 of 2</a:t>
+            </a:r>
+          </a:p>
+        </p:txBody>
+      </p:sp>
+      <p:sp>
+        <p:nvSpPr>
+          <p:cNvPr id="7" name="TextBox 6">
+            <a:extLst>
+              <a:ext uri="{FF2B5EF4-FFF2-40B4-BE49-F238E27FC236}">
+                <a16:creationId xmlns:a16="http://schemas.microsoft.com/office/drawing/2014/main" id="{B9BE8F29-0023-4E8A-89C0-3EF29D37DCA2}"/>
+              </a:ext>
+            </a:extLst>
+          </p:cNvPr>
+          <p:cNvSpPr txBox="1"/>
+          <p:nvPr/>
+        </p:nvSpPr>
+        <p:spPr>
+          <a:xfrm>
+            <a:off x="144379" y="1496338"/>
+            <a:ext cx="4299284" cy="5016758"/>
+          </a:xfrm>
+          <a:prstGeom prst="rect">
+            <a:avLst/>
+          </a:prstGeom>
+          <a:noFill/>
+        </p:spPr>
+        <p:txBody>
+          <a:bodyPr wrap="square" rtlCol="0">
+            <a:spAutoFit/>
+          </a:bodyPr>
+          <a:lstStyle/>
+          <a:p>
+            <a:pPr marL="285750" indent="-285750">
+              <a:buFont typeface="Arial" panose="020B0604020202020204" pitchFamily="34" charset="0"/>
+              <a:buChar char="•"/>
+            </a:pPr>
+            <a:r>
+              <a:rPr lang="en-US" sz="2000" dirty="0"/>
+              <a:t>Acknowledging that college is a business in the United States, one could hypothesize that we should see a decent correlation between Wealth/ADA ($) and college enrollment percentage. </a:t>
+            </a:r>
+          </a:p>
+          <a:p>
+            <a:pPr marL="285750" indent="-285750">
+              <a:buFont typeface="Arial" panose="020B0604020202020204" pitchFamily="34" charset="0"/>
+              <a:buChar char="•"/>
+            </a:pPr>
+            <a:endParaRPr lang="en-US" sz="2000" dirty="0"/>
+          </a:p>
+          <a:p>
+            <a:pPr marL="285750" indent="-285750">
+              <a:buFont typeface="Arial" panose="020B0604020202020204" pitchFamily="34" charset="0"/>
+              <a:buChar char="•"/>
+            </a:pPr>
+            <a:endParaRPr lang="en-US" sz="2000" dirty="0"/>
+          </a:p>
+          <a:p>
+            <a:pPr marL="285750" indent="-285750">
+              <a:buFont typeface="Arial" panose="020B0604020202020204" pitchFamily="34" charset="0"/>
+              <a:buChar char="•"/>
+            </a:pPr>
+            <a:r>
+              <a:rPr lang="en-US" sz="2000" dirty="0"/>
+              <a:t>There does exist a positive correlation between the two, but its important to acknowledge that Wealth/ADA is not the sole factor in determining college enrollment percentage.</a:t>
+            </a:r>
+          </a:p>
+          <a:p>
+            <a:endParaRPr lang="en-US" sz="2000" dirty="0"/>
+          </a:p>
+          <a:p>
+            <a:pPr algn="ctr"/>
+            <a:r>
+              <a:rPr lang="en-US" sz="2000" dirty="0"/>
+              <a:t> (SAT/ACT/AP etc.….)</a:t>
+            </a:r>
+          </a:p>
+        </p:txBody>
+      </p:sp>
+    </p:spTree>
+    <p:extLst>
+      <p:ext uri="{BB962C8B-B14F-4D97-AF65-F5344CB8AC3E}">
+        <p14:creationId xmlns:p14="http://schemas.microsoft.com/office/powerpoint/2010/main" val="4072279281"/>
+      </p:ext>
+    </p:extLst>
+  </p:cSld>
+  <p:clrMapOvr>
+    <a:masterClrMapping/>
+  </p:clrMapOvr>
+</p:sld>
+</file>
+
+<file path=ppt/slides/slide13.xml><?xml version="1.0" encoding="utf-8"?>
+<p:sld xmlns:a="http://schemas.openxmlformats.org/drawingml/2006/main" xmlns:r="http://schemas.openxmlformats.org/officeDocument/2006/relationships" xmlns:p="http://schemas.openxmlformats.org/presentationml/2006/main">
+  <p:cSld>
+    <p:spTree>
+      <p:nvGrpSpPr>
+        <p:cNvPr id="1" name=""/>
+        <p:cNvGrpSpPr/>
+        <p:nvPr/>
+      </p:nvGrpSpPr>
+      <p:grpSpPr>
+        <a:xfrm>
+          <a:off x="0" y="0"/>
+          <a:ext cx="0" cy="0"/>
+          <a:chOff x="0" y="0"/>
+          <a:chExt cx="0" cy="0"/>
+        </a:xfrm>
+      </p:grpSpPr>
+      <p:sp>
+        <p:nvSpPr>
+          <p:cNvPr id="6" name="TextBox 5">
+            <a:extLst>
+              <a:ext uri="{FF2B5EF4-FFF2-40B4-BE49-F238E27FC236}">
+                <a16:creationId xmlns:a16="http://schemas.microsoft.com/office/drawing/2014/main" id="{61917F3E-63FA-42DF-9480-3BE14488E124}"/>
+              </a:ext>
+            </a:extLst>
+          </p:cNvPr>
+          <p:cNvSpPr txBox="1"/>
+          <p:nvPr/>
+        </p:nvSpPr>
+        <p:spPr>
+          <a:xfrm>
+            <a:off x="1540042" y="144379"/>
+            <a:ext cx="8726905" cy="1200329"/>
+          </a:xfrm>
+          <a:prstGeom prst="rect">
+            <a:avLst/>
+          </a:prstGeom>
+          <a:noFill/>
+        </p:spPr>
+        <p:txBody>
+          <a:bodyPr wrap="square" rtlCol="0">
+            <a:spAutoFit/>
+          </a:bodyPr>
+          <a:lstStyle/>
+          <a:p>
+            <a:pPr algn="ctr"/>
+            <a:r>
+              <a:rPr lang="en-US" sz="2400" b="1" dirty="0"/>
+              <a:t>Data Analysis: (Wealth/ADA ($) Effect on College Enrollment Percentage vs. College Graduation Percentage) </a:t>
+            </a:r>
+          </a:p>
+          <a:p>
+            <a:pPr algn="ctr"/>
+            <a:r>
+              <a:rPr lang="en-US" sz="2400" b="1" dirty="0"/>
+              <a:t>PART 2 of 2</a:t>
+            </a:r>
+          </a:p>
+        </p:txBody>
+      </p:sp>
+      <p:sp>
+        <p:nvSpPr>
+          <p:cNvPr id="7" name="TextBox 6">
+            <a:extLst>
+              <a:ext uri="{FF2B5EF4-FFF2-40B4-BE49-F238E27FC236}">
+                <a16:creationId xmlns:a16="http://schemas.microsoft.com/office/drawing/2014/main" id="{B9BE8F29-0023-4E8A-89C0-3EF29D37DCA2}"/>
+              </a:ext>
+            </a:extLst>
+          </p:cNvPr>
+          <p:cNvSpPr txBox="1"/>
+          <p:nvPr/>
+        </p:nvSpPr>
+        <p:spPr>
+          <a:xfrm>
+            <a:off x="80208" y="2186149"/>
+            <a:ext cx="4299284" cy="3170099"/>
+          </a:xfrm>
+          <a:prstGeom prst="rect">
+            <a:avLst/>
+          </a:prstGeom>
+          <a:noFill/>
+        </p:spPr>
+        <p:txBody>
+          <a:bodyPr wrap="square" rtlCol="0">
+            <a:spAutoFit/>
+          </a:bodyPr>
+          <a:lstStyle/>
+          <a:p>
+            <a:pPr marL="342900" indent="-342900">
+              <a:buFont typeface="Arial" panose="020B0604020202020204" pitchFamily="34" charset="0"/>
+              <a:buChar char="•"/>
+            </a:pPr>
+            <a:r>
+              <a:rPr lang="en-US" sz="2000" dirty="0"/>
+              <a:t>The correlation between Wealth/ADA and college graduation was a little bit weaker, but still positive. </a:t>
+            </a:r>
+          </a:p>
+          <a:p>
+            <a:pPr marL="342900" indent="-342900">
+              <a:buFont typeface="Arial" panose="020B0604020202020204" pitchFamily="34" charset="0"/>
+              <a:buChar char="•"/>
+            </a:pPr>
+            <a:endParaRPr lang="en-US" sz="2000" dirty="0"/>
+          </a:p>
+          <a:p>
+            <a:pPr marL="342900" indent="-342900">
+              <a:buFont typeface="Arial" panose="020B0604020202020204" pitchFamily="34" charset="0"/>
+              <a:buChar char="•"/>
+            </a:pPr>
+            <a:endParaRPr lang="en-US" sz="2000" dirty="0"/>
+          </a:p>
+          <a:p>
+            <a:pPr marL="342900" indent="-342900">
+              <a:buFont typeface="Arial" panose="020B0604020202020204" pitchFamily="34" charset="0"/>
+              <a:buChar char="•"/>
+            </a:pPr>
+            <a:r>
+              <a:rPr lang="en-US" sz="2000" dirty="0"/>
+              <a:t>This is where the student’s actual education has the upper hand in determining if they can earn a degree</a:t>
+            </a:r>
+          </a:p>
+        </p:txBody>
+      </p:sp>
+      <p:pic>
+        <p:nvPicPr>
+          <p:cNvPr id="5" name="Picture 4">
+            <a:extLst>
+              <a:ext uri="{FF2B5EF4-FFF2-40B4-BE49-F238E27FC236}">
+                <a16:creationId xmlns:a16="http://schemas.microsoft.com/office/drawing/2014/main" id="{D5FFB3C5-CBDA-4DDC-9BD9-BF9E32E9AA61}"/>
+              </a:ext>
+            </a:extLst>
+          </p:cNvPr>
+          <p:cNvPicPr/>
+          <p:nvPr/>
+        </p:nvPicPr>
+        <p:blipFill>
+          <a:blip r:embed="rId2"/>
+          <a:stretch>
+            <a:fillRect/>
+          </a:stretch>
+        </p:blipFill>
+        <p:spPr>
+          <a:xfrm>
+            <a:off x="4654468" y="1696864"/>
+            <a:ext cx="7457324" cy="5016757"/>
+          </a:xfrm>
+          <a:prstGeom prst="rect">
+            <a:avLst/>
+          </a:prstGeom>
+        </p:spPr>
+      </p:pic>
+    </p:spTree>
+    <p:extLst>
+      <p:ext uri="{BB962C8B-B14F-4D97-AF65-F5344CB8AC3E}">
+        <p14:creationId xmlns:p14="http://schemas.microsoft.com/office/powerpoint/2010/main" val="1714310185"/>
       </p:ext>
     </p:extLst>
   </p:cSld>
@@ -3502,8 +4235,8 @@
         </p:blipFill>
         <p:spPr>
           <a:xfrm>
-            <a:off x="6593306" y="2212377"/>
-            <a:ext cx="5470357" cy="3801979"/>
+            <a:off x="7170821" y="2212377"/>
+            <a:ext cx="4892842" cy="3801979"/>
           </a:xfrm>
           <a:prstGeom prst="rect">
             <a:avLst/>
@@ -3524,8 +4257,8 @@
         </p:nvSpPr>
         <p:spPr>
           <a:xfrm>
-            <a:off x="128337" y="1656576"/>
-            <a:ext cx="6464970" cy="5201424"/>
+            <a:off x="128337" y="1376874"/>
+            <a:ext cx="7042484" cy="4893647"/>
           </a:xfrm>
           <a:prstGeom prst="rect">
             <a:avLst/>
@@ -3540,7 +4273,7 @@
           <a:p>
             <a:r>
               <a:rPr lang="en-US" sz="2400" dirty="0"/>
-              <a:t>In this study, 2011 - 2017 data was collected from the following resources:</a:t>
+              <a:t>In this study, 2011 - 2017 data was collected from the following two resources:</a:t>
             </a:r>
           </a:p>
           <a:p>
@@ -3587,13 +4320,16 @@
           <a:p>
             <a:r>
               <a:rPr lang="en-US" sz="2400" dirty="0"/>
-              <a:t>The data was then filtered to focus public school districts within the major regions of Texas. The major regions represent areas with the most economic opportunity, making them prime locations for families and talented educators. </a:t>
-            </a:r>
-          </a:p>
-          <a:p>
-            <a:r>
-              <a:rPr lang="en-US" sz="2000" dirty="0"/>
-              <a:t> </a:t>
+              <a:t>The data was then filtered to focus public school districts within the major regions of Texas. </a:t>
+            </a:r>
+          </a:p>
+          <a:p>
+            <a:endParaRPr lang="en-US" sz="2400" dirty="0"/>
+          </a:p>
+          <a:p>
+            <a:r>
+              <a:rPr lang="en-US" sz="2400" dirty="0"/>
+              <a:t>The college enrollment and graduation data utilized in this study only considers Texas colleges. </a:t>
             </a:r>
             <a:endParaRPr lang="en-US" sz="2800" dirty="0"/>
           </a:p>
@@ -3687,8 +4423,8 @@
         </p:blipFill>
         <p:spPr>
           <a:xfrm>
-            <a:off x="4475746" y="1260629"/>
-            <a:ext cx="7716253" cy="5205663"/>
+            <a:off x="5390147" y="1260629"/>
+            <a:ext cx="6801852" cy="5205663"/>
           </a:xfrm>
           <a:prstGeom prst="rect">
             <a:avLst/>
@@ -3709,8 +4445,8 @@
         </p:nvSpPr>
         <p:spPr>
           <a:xfrm>
-            <a:off x="240631" y="1260629"/>
-            <a:ext cx="4235115" cy="5016758"/>
+            <a:off x="1" y="1154210"/>
+            <a:ext cx="5390146" cy="5693866"/>
           </a:xfrm>
           <a:prstGeom prst="rect">
             <a:avLst/>
@@ -3728,8 +4464,8 @@
               <a:buChar char="•"/>
             </a:pPr>
             <a:r>
-              <a:rPr lang="en-US" sz="3200" dirty="0"/>
-              <a:t>Here’s how the Texas Education Agency splits up its educational regions for reporting data</a:t>
+              <a:rPr lang="en-US" sz="2800" dirty="0"/>
+              <a:t>The major regions represent areas with the most economic opportunity, making them prime locations for families and talented educators. </a:t>
             </a:r>
           </a:p>
           <a:p>
@@ -3737,7 +4473,7 @@
               <a:buFont typeface="Arial" panose="020B0604020202020204" pitchFamily="34" charset="0"/>
               <a:buChar char="•"/>
             </a:pPr>
-            <a:endParaRPr lang="en-US" sz="3200" dirty="0"/>
+            <a:endParaRPr lang="en-US" sz="2800" dirty="0"/>
           </a:p>
           <a:p>
             <a:pPr marL="457200" indent="-457200">
@@ -3745,7 +4481,24 @@
               <a:buChar char="•"/>
             </a:pPr>
             <a:r>
-              <a:rPr lang="en-US" sz="3200" dirty="0"/>
+              <a:rPr lang="en-US" sz="2800" dirty="0"/>
+              <a:t>Here’s how the Texas Education Agency splits up its educational regions for reporting data</a:t>
+            </a:r>
+          </a:p>
+          <a:p>
+            <a:pPr marL="457200" indent="-457200">
+              <a:buFont typeface="Arial" panose="020B0604020202020204" pitchFamily="34" charset="0"/>
+              <a:buChar char="•"/>
+            </a:pPr>
+            <a:endParaRPr lang="en-US" sz="2800" dirty="0"/>
+          </a:p>
+          <a:p>
+            <a:pPr marL="457200" indent="-457200">
+              <a:buFont typeface="Arial" panose="020B0604020202020204" pitchFamily="34" charset="0"/>
+              <a:buChar char="•"/>
+            </a:pPr>
+            <a:r>
+              <a:rPr lang="en-US" sz="2800" dirty="0"/>
               <a:t>The school districts utilized in this study exist within the highlighted regions</a:t>
             </a:r>
           </a:p>
@@ -3886,8 +4639,8 @@
         </p:blipFill>
         <p:spPr>
           <a:xfrm>
-            <a:off x="7074568" y="1761120"/>
-            <a:ext cx="4892841" cy="4592798"/>
+            <a:off x="7074568" y="1789692"/>
+            <a:ext cx="5117431" cy="4567415"/>
           </a:xfrm>
           <a:prstGeom prst="rect">
             <a:avLst/>
@@ -3953,7 +4706,7 @@
             <a:pPr algn="ctr"/>
             <a:r>
               <a:rPr lang="en-US" b="1" dirty="0"/>
-              <a:t>Asking the Right Questions (Part 1) </a:t>
+              <a:t>Asking the Right Question</a:t>
             </a:r>
           </a:p>
         </p:txBody>
@@ -3976,8 +4729,8 @@
         </p:nvSpPr>
         <p:spPr>
           <a:xfrm>
-            <a:off x="20053" y="990223"/>
-            <a:ext cx="6669505" cy="5710990"/>
+            <a:off x="20053" y="1066047"/>
+            <a:ext cx="7904745" cy="5710990"/>
           </a:xfrm>
         </p:spPr>
         <p:txBody>
@@ -3988,7 +4741,7 @@
           <a:p>
             <a:r>
               <a:rPr lang="en-US" sz="3200" dirty="0"/>
-              <a:t>The better question for parents to ask is “which school districts improve the likelihood that my child will be able to earn their degree in college?”</a:t>
+              <a:t>The better question for parents to ask is “which school districts have historically proven to have a higher percentage of its graduates earn a college degree within four years?” </a:t>
             </a:r>
           </a:p>
           <a:p>
@@ -4033,8 +4786,8 @@
         </p:blipFill>
         <p:spPr>
           <a:xfrm>
-            <a:off x="6946233" y="3845718"/>
-            <a:ext cx="5225714" cy="3012282"/>
+            <a:off x="8085221" y="3845718"/>
+            <a:ext cx="4086726" cy="3012282"/>
           </a:xfrm>
           <a:prstGeom prst="rect">
             <a:avLst/>
@@ -4063,8 +4816,8 @@
         </p:blipFill>
         <p:spPr>
           <a:xfrm>
-            <a:off x="6946233" y="914399"/>
-            <a:ext cx="5225714" cy="2931319"/>
+            <a:off x="8085221" y="914399"/>
+            <a:ext cx="4086725" cy="2931319"/>
           </a:xfrm>
           <a:prstGeom prst="rect">
             <a:avLst/>
@@ -4106,7 +4859,7 @@
           <p:cNvPr id="2" name="Title 1">
             <a:extLst>
               <a:ext uri="{FF2B5EF4-FFF2-40B4-BE49-F238E27FC236}">
-                <a16:creationId xmlns:a16="http://schemas.microsoft.com/office/drawing/2014/main" id="{A30C9E90-371F-4FD2-B177-4410D6AA0DF8}"/>
+                <a16:creationId xmlns:a16="http://schemas.microsoft.com/office/drawing/2014/main" id="{F718097E-339E-4A91-9838-F43ECB8849A5}"/>
               </a:ext>
             </a:extLst>
           </p:cNvPr>
@@ -4119,18 +4872,25 @@
         </p:nvSpPr>
         <p:spPr>
           <a:xfrm>
-            <a:off x="2394382" y="0"/>
-            <a:ext cx="8116779" cy="1325563"/>
-          </a:xfrm>
-        </p:spPr>
-        <p:txBody>
-          <a:bodyPr/>
-          <a:lstStyle/>
-          <a:p>
-            <a:r>
+            <a:off x="515351" y="168777"/>
+            <a:ext cx="11161295" cy="1325563"/>
+          </a:xfrm>
+        </p:spPr>
+        <p:txBody>
+          <a:bodyPr>
+            <a:normAutofit fontScale="90000"/>
+          </a:bodyPr>
+          <a:lstStyle/>
+          <a:p>
+            <a:pPr algn="ctr"/>
+            <a:r>
+              <a:rPr lang="en-US" sz="5400" b="1" dirty="0"/>
+              <a:t>Aim of the Project/Problem I Want to Solve:</a:t>
+            </a:r>
+            <a:br>
               <a:rPr lang="en-US" b="1" dirty="0"/>
-              <a:t>Asking the Right Questions (Part 2)</a:t>
-            </a:r>
+            </a:br>
+            <a:endParaRPr lang="en-US" b="1" dirty="0"/>
           </a:p>
         </p:txBody>
       </p:sp>
@@ -4139,7 +4899,7 @@
           <p:cNvPr id="3" name="Content Placeholder 2">
             <a:extLst>
               <a:ext uri="{FF2B5EF4-FFF2-40B4-BE49-F238E27FC236}">
-                <a16:creationId xmlns:a16="http://schemas.microsoft.com/office/drawing/2014/main" id="{EE04F2E2-FFC7-4773-879B-D3D19E4C8D12}"/>
+                <a16:creationId xmlns:a16="http://schemas.microsoft.com/office/drawing/2014/main" id="{0DAB6C2A-A6E0-4444-B009-73C45BFDABA7}"/>
               </a:ext>
             </a:extLst>
           </p:cNvPr>
@@ -4152,8 +4912,8 @@
         </p:nvSpPr>
         <p:spPr>
           <a:xfrm>
-            <a:off x="0" y="1078785"/>
-            <a:ext cx="5406188" cy="5793381"/>
+            <a:off x="0" y="1379621"/>
+            <a:ext cx="12192000" cy="5594517"/>
           </a:xfrm>
         </p:spPr>
         <p:txBody>
@@ -4163,59 +4923,34 @@
           <a:lstStyle/>
           <a:p>
             <a:r>
-              <a:rPr lang="en-US" dirty="0"/>
-              <a:t>In a 2011 Harvard study “Pathways to Prosperity”, the U.S. contained the highest college dropout rate among industrialized nations.</a:t>
-            </a:r>
-          </a:p>
-          <a:p>
-            <a:r>
-              <a:rPr lang="en-US" dirty="0"/>
-              <a:t>Among four-year colleges, just 56% of students graduated within six years (not four. Remember… more time spent means more money spent).</a:t>
-            </a:r>
-          </a:p>
-          <a:p>
-            <a:r>
-              <a:rPr lang="en-US" b="1" u="sng" dirty="0"/>
-              <a:t>Financial pressure and academic disqualification are the top two reasons why a student drops out.</a:t>
-            </a:r>
-            <a:endParaRPr lang="en-US" dirty="0"/>
-          </a:p>
-        </p:txBody>
-      </p:sp>
-      <p:pic>
-        <p:nvPicPr>
-          <p:cNvPr id="4" name="Picture 3">
-            <a:extLst>
-              <a:ext uri="{FF2B5EF4-FFF2-40B4-BE49-F238E27FC236}">
-                <a16:creationId xmlns:a16="http://schemas.microsoft.com/office/drawing/2014/main" id="{66069FDD-45B1-4972-9136-A1E30052E055}"/>
-              </a:ext>
-            </a:extLst>
-          </p:cNvPr>
-          <p:cNvPicPr>
-            <a:picLocks noChangeAspect="1"/>
-          </p:cNvPicPr>
-          <p:nvPr/>
-        </p:nvPicPr>
-        <p:blipFill>
-          <a:blip r:embed="rId2"/>
-          <a:stretch>
-            <a:fillRect/>
-          </a:stretch>
-        </p:blipFill>
-        <p:spPr>
-          <a:xfrm>
-            <a:off x="5406188" y="1078785"/>
-            <a:ext cx="6634892" cy="5546603"/>
-          </a:xfrm>
-          <a:prstGeom prst="rect">
-            <a:avLst/>
-          </a:prstGeom>
-        </p:spPr>
-      </p:pic>
+              <a:rPr lang="en-US" sz="4000" dirty="0"/>
+              <a:t>Through this project, I aimed to study the relationship between the percentage of college students who graduate within four years and the features of the school district they attended high school in. </a:t>
+            </a:r>
+          </a:p>
+          <a:p>
+            <a:pPr marL="0" indent="0">
+              <a:buNone/>
+            </a:pPr>
+            <a:endParaRPr lang="en-US" sz="4000" dirty="0"/>
+          </a:p>
+          <a:p>
+            <a:r>
+              <a:rPr lang="en-US" sz="4000" dirty="0"/>
+              <a:t>In order to achieve this goal, historical district features were collected along with the resulting percentage of students who were able to earn their college degree within four years. </a:t>
+            </a:r>
+          </a:p>
+          <a:p>
+            <a:pPr marL="0" indent="0">
+              <a:buNone/>
+            </a:pPr>
+            <a:endParaRPr lang="en-US" sz="3200" dirty="0"/>
+          </a:p>
+        </p:txBody>
+      </p:sp>
     </p:spTree>
     <p:extLst>
       <p:ext uri="{BB962C8B-B14F-4D97-AF65-F5344CB8AC3E}">
-        <p14:creationId xmlns:p14="http://schemas.microsoft.com/office/powerpoint/2010/main" val="1843748395"/>
+        <p14:creationId xmlns:p14="http://schemas.microsoft.com/office/powerpoint/2010/main" val="1672466808"/>
       </p:ext>
     </p:extLst>
   </p:cSld>
@@ -4247,7 +4982,7 @@
           <p:cNvPr id="2" name="Title 1">
             <a:extLst>
               <a:ext uri="{FF2B5EF4-FFF2-40B4-BE49-F238E27FC236}">
-                <a16:creationId xmlns:a16="http://schemas.microsoft.com/office/drawing/2014/main" id="{F718097E-339E-4A91-9838-F43ECB8849A5}"/>
+                <a16:creationId xmlns:a16="http://schemas.microsoft.com/office/drawing/2014/main" id="{ABE6FA28-6183-4788-88EF-A7116446E205}"/>
               </a:ext>
             </a:extLst>
           </p:cNvPr>
@@ -4260,79 +4995,197 @@
         </p:nvSpPr>
         <p:spPr>
           <a:xfrm>
-            <a:off x="838200" y="140536"/>
-            <a:ext cx="10515600" cy="1325563"/>
+            <a:off x="2540493" y="60170"/>
+            <a:ext cx="7111014" cy="744584"/>
+          </a:xfrm>
+        </p:spPr>
+        <p:txBody>
+          <a:bodyPr/>
+          <a:lstStyle/>
+          <a:p>
+            <a:pPr algn="ctr"/>
+            <a:r>
+              <a:rPr lang="en-US" b="1" dirty="0"/>
+              <a:t>College Admissions Tests</a:t>
+            </a:r>
+          </a:p>
+        </p:txBody>
+      </p:sp>
+      <p:sp>
+        <p:nvSpPr>
+          <p:cNvPr id="3" name="Content Placeholder 2">
+            <a:extLst>
+              <a:ext uri="{FF2B5EF4-FFF2-40B4-BE49-F238E27FC236}">
+                <a16:creationId xmlns:a16="http://schemas.microsoft.com/office/drawing/2014/main" id="{5C36CCC9-DED2-45E9-BD54-EBC2B8745B77}"/>
+              </a:ext>
+            </a:extLst>
+          </p:cNvPr>
+          <p:cNvSpPr>
+            <a:spLocks noGrp="1"/>
+          </p:cNvSpPr>
+          <p:nvPr>
+            <p:ph idx="1"/>
+          </p:nvPr>
+        </p:nvSpPr>
+        <p:spPr>
+          <a:xfrm>
+            <a:off x="0" y="1020624"/>
+            <a:ext cx="7111014" cy="5661587"/>
           </a:xfrm>
         </p:spPr>
         <p:txBody>
           <a:bodyPr>
-            <a:normAutofit fontScale="90000"/>
+            <a:normAutofit fontScale="47500" lnSpcReduction="20000"/>
           </a:bodyPr>
           <a:lstStyle/>
           <a:p>
-            <a:pPr algn="ctr"/>
-            <a:r>
-              <a:rPr lang="en-US" sz="5400" b="1" dirty="0"/>
-              <a:t>Aim of the Project:</a:t>
-            </a:r>
-            <a:br>
-              <a:rPr lang="en-US" b="1" dirty="0"/>
-            </a:br>
-            <a:endParaRPr lang="en-US" b="1" dirty="0"/>
-          </a:p>
-        </p:txBody>
-      </p:sp>
-      <p:sp>
-        <p:nvSpPr>
-          <p:cNvPr id="3" name="Content Placeholder 2">
-            <a:extLst>
-              <a:ext uri="{FF2B5EF4-FFF2-40B4-BE49-F238E27FC236}">
-                <a16:creationId xmlns:a16="http://schemas.microsoft.com/office/drawing/2014/main" id="{0DAB6C2A-A6E0-4444-B009-73C45BFDABA7}"/>
-              </a:ext>
-            </a:extLst>
-          </p:cNvPr>
-          <p:cNvSpPr>
-            <a:spLocks noGrp="1"/>
-          </p:cNvSpPr>
-          <p:nvPr>
-            <p:ph idx="1"/>
-          </p:nvPr>
-        </p:nvSpPr>
-        <p:spPr>
-          <a:xfrm>
-            <a:off x="515352" y="1122947"/>
-            <a:ext cx="11161295" cy="5594517"/>
-          </a:xfrm>
-        </p:spPr>
-        <p:txBody>
-          <a:bodyPr>
-            <a:normAutofit/>
-          </a:bodyPr>
-          <a:lstStyle/>
-          <a:p>
-            <a:r>
-              <a:rPr lang="en-US" sz="3600" dirty="0"/>
-              <a:t>Through this project, I aimed to reasonably predict the likelihood of a student earning a college degree four years after graduating high school from a certain school district. </a:t>
-            </a:r>
-          </a:p>
-          <a:p>
-            <a:r>
-              <a:rPr lang="en-US" sz="3600" dirty="0"/>
-              <a:t>In order to do this, historical district features were collected in addition to college graduation data to train a predictive model.</a:t>
-            </a:r>
-          </a:p>
-          <a:p>
-            <a:r>
-              <a:rPr lang="en-US" sz="3600" dirty="0"/>
-              <a:t>This model can help answer parents’ question about what districts increase their child’s likelihood of earning their degree within four years. </a:t>
-            </a:r>
-          </a:p>
-        </p:txBody>
-      </p:sp>
+            <a:pPr marL="0" indent="0" algn="ctr">
+              <a:buNone/>
+            </a:pPr>
+            <a:endParaRPr lang="en-US" sz="3600" b="1" u="sng" dirty="0"/>
+          </a:p>
+          <a:p>
+            <a:pPr marL="0" indent="0" algn="ctr">
+              <a:buNone/>
+            </a:pPr>
+            <a:r>
+              <a:rPr lang="en-US" sz="5100" b="1" u="sng" dirty="0"/>
+              <a:t>SAT</a:t>
+            </a:r>
+            <a:endParaRPr lang="en-US" sz="5100" dirty="0"/>
+          </a:p>
+          <a:p>
+            <a:r>
+              <a:rPr lang="en-US" sz="5100" dirty="0"/>
+              <a:t>Highest Possible Score is a 1600</a:t>
+            </a:r>
+          </a:p>
+          <a:p>
+            <a:pPr marL="0" indent="0" algn="ctr">
+              <a:buNone/>
+            </a:pPr>
+            <a:endParaRPr lang="en-US" sz="5100" dirty="0"/>
+          </a:p>
+          <a:p>
+            <a:pPr marL="0" indent="0" algn="ctr">
+              <a:buNone/>
+            </a:pPr>
+            <a:r>
+              <a:rPr lang="en-US" sz="5100" dirty="0"/>
+              <a:t>SAT(Total) = Math (800) + Reading/Writing (800)</a:t>
+            </a:r>
+          </a:p>
+          <a:p>
+            <a:pPr marL="0" indent="0">
+              <a:buNone/>
+            </a:pPr>
+            <a:r>
+              <a:rPr lang="en-US" sz="5100" dirty="0"/>
+              <a:t>	</a:t>
+            </a:r>
+          </a:p>
+          <a:p>
+            <a:pPr marL="0" indent="0" algn="ctr">
+              <a:buNone/>
+            </a:pPr>
+            <a:endParaRPr lang="en-US" sz="5100" b="1" u="sng" dirty="0"/>
+          </a:p>
+          <a:p>
+            <a:pPr marL="0" indent="0" algn="ctr">
+              <a:buNone/>
+            </a:pPr>
+            <a:r>
+              <a:rPr lang="en-US" sz="5100" b="1" u="sng" dirty="0"/>
+              <a:t>ACT</a:t>
+            </a:r>
+          </a:p>
+          <a:p>
+            <a:r>
+              <a:rPr lang="en-US" sz="5100" dirty="0"/>
+              <a:t>Highest Possible Score is a 36</a:t>
+            </a:r>
+          </a:p>
+          <a:p>
+            <a:endParaRPr lang="en-US" sz="5100" dirty="0"/>
+          </a:p>
+          <a:p>
+            <a:pPr marL="0" indent="0" algn="ctr">
+              <a:buNone/>
+            </a:pPr>
+            <a:r>
+              <a:rPr lang="en-US" sz="5100" dirty="0"/>
+              <a:t>ACT (Composite) = </a:t>
+            </a:r>
+          </a:p>
+          <a:p>
+            <a:pPr marL="0" indent="0" algn="ctr">
+              <a:buNone/>
+            </a:pPr>
+            <a:r>
+              <a:rPr lang="en-US" sz="5100" dirty="0"/>
+              <a:t>(Math (36) + Reading (36) + English (36) + Science (36))</a:t>
+            </a:r>
+          </a:p>
+          <a:p>
+            <a:pPr marL="0" indent="0" algn="ctr">
+              <a:buNone/>
+            </a:pPr>
+            <a:r>
+              <a:rPr lang="en-US" sz="5100" dirty="0"/>
+              <a:t>/  4</a:t>
+            </a:r>
+          </a:p>
+          <a:p>
+            <a:pPr marL="0" indent="0">
+              <a:buNone/>
+            </a:pPr>
+            <a:endParaRPr lang="en-US" sz="2600" dirty="0"/>
+          </a:p>
+          <a:p>
+            <a:pPr marL="0" indent="0">
+              <a:buNone/>
+            </a:pPr>
+            <a:r>
+              <a:rPr lang="en-US" dirty="0"/>
+              <a:t> </a:t>
+            </a:r>
+          </a:p>
+        </p:txBody>
+      </p:sp>
+      <p:pic>
+        <p:nvPicPr>
+          <p:cNvPr id="4" name="Picture 3">
+            <a:extLst>
+              <a:ext uri="{FF2B5EF4-FFF2-40B4-BE49-F238E27FC236}">
+                <a16:creationId xmlns:a16="http://schemas.microsoft.com/office/drawing/2014/main" id="{3FA2DA13-0A9E-42C3-B28A-73A8FF1591D6}"/>
+              </a:ext>
+            </a:extLst>
+          </p:cNvPr>
+          <p:cNvPicPr>
+            <a:picLocks noChangeAspect="1"/>
+          </p:cNvPicPr>
+          <p:nvPr/>
+        </p:nvPicPr>
+        <p:blipFill>
+          <a:blip r:embed="rId2"/>
+          <a:stretch>
+            <a:fillRect/>
+          </a:stretch>
+        </p:blipFill>
+        <p:spPr>
+          <a:xfrm>
+            <a:off x="7111014" y="1588559"/>
+            <a:ext cx="5080986" cy="4525715"/>
+          </a:xfrm>
+          <a:prstGeom prst="rect">
+            <a:avLst/>
+          </a:prstGeom>
+        </p:spPr>
+      </p:pic>
     </p:spTree>
     <p:extLst>
       <p:ext uri="{BB962C8B-B14F-4D97-AF65-F5344CB8AC3E}">
-        <p14:creationId xmlns:p14="http://schemas.microsoft.com/office/powerpoint/2010/main" val="1672466808"/>
+        <p14:creationId xmlns:p14="http://schemas.microsoft.com/office/powerpoint/2010/main" val="2040617450"/>
       </p:ext>
     </p:extLst>
   </p:cSld>
@@ -4364,7 +5217,7 @@
           <p:cNvPr id="2" name="Title 1">
             <a:extLst>
               <a:ext uri="{FF2B5EF4-FFF2-40B4-BE49-F238E27FC236}">
-                <a16:creationId xmlns:a16="http://schemas.microsoft.com/office/drawing/2014/main" id="{ABE6FA28-6183-4788-88EF-A7116446E205}"/>
+                <a16:creationId xmlns:a16="http://schemas.microsoft.com/office/drawing/2014/main" id="{1CE3BCB5-3A8D-4D52-9BB1-CD52C56B5D7B}"/>
               </a:ext>
             </a:extLst>
           </p:cNvPr>
@@ -4377,159 +5230,20 @@
         </p:nvSpPr>
         <p:spPr>
           <a:xfrm>
-            <a:off x="2540493" y="60170"/>
-            <a:ext cx="7111014" cy="744584"/>
-          </a:xfrm>
-        </p:spPr>
-        <p:txBody>
-          <a:bodyPr/>
+            <a:off x="71020" y="0"/>
+            <a:ext cx="7510509" cy="679948"/>
+          </a:xfrm>
+        </p:spPr>
+        <p:txBody>
+          <a:bodyPr>
+            <a:normAutofit fontScale="90000"/>
+          </a:bodyPr>
           <a:lstStyle/>
           <a:p>
             <a:pPr algn="ctr"/>
             <a:r>
               <a:rPr lang="en-US" b="1" dirty="0"/>
-              <a:t>College Admissions Tests</a:t>
-            </a:r>
-          </a:p>
-        </p:txBody>
-      </p:sp>
-      <p:sp>
-        <p:nvSpPr>
-          <p:cNvPr id="3" name="Content Placeholder 2">
-            <a:extLst>
-              <a:ext uri="{FF2B5EF4-FFF2-40B4-BE49-F238E27FC236}">
-                <a16:creationId xmlns:a16="http://schemas.microsoft.com/office/drawing/2014/main" id="{5C36CCC9-DED2-45E9-BD54-EBC2B8745B77}"/>
-              </a:ext>
-            </a:extLst>
-          </p:cNvPr>
-          <p:cNvSpPr>
-            <a:spLocks noGrp="1"/>
-          </p:cNvSpPr>
-          <p:nvPr>
-            <p:ph idx="1"/>
-          </p:nvPr>
-        </p:nvSpPr>
-        <p:spPr>
-          <a:xfrm>
-            <a:off x="0" y="763950"/>
-            <a:ext cx="7111014" cy="5661587"/>
-          </a:xfrm>
-        </p:spPr>
-        <p:txBody>
-          <a:bodyPr>
-            <a:normAutofit fontScale="47500" lnSpcReduction="20000"/>
-          </a:bodyPr>
-          <a:lstStyle/>
-          <a:p>
-            <a:pPr marL="0" indent="0" algn="ctr">
-              <a:buNone/>
-            </a:pPr>
-            <a:endParaRPr lang="en-US" sz="3600" b="1" u="sng" dirty="0"/>
-          </a:p>
-          <a:p>
-            <a:pPr marL="0" indent="0" algn="ctr">
-              <a:buNone/>
-            </a:pPr>
-            <a:r>
-              <a:rPr lang="en-US" sz="5100" b="1" u="sng" dirty="0"/>
-              <a:t>SAT</a:t>
-            </a:r>
-            <a:endParaRPr lang="en-US" sz="5100" dirty="0"/>
-          </a:p>
-          <a:p>
-            <a:r>
-              <a:rPr lang="en-US" sz="5100" dirty="0"/>
-              <a:t>Highest Possible Score is a 1600</a:t>
-            </a:r>
-          </a:p>
-          <a:p>
-            <a:pPr marL="0" indent="0" algn="ctr">
-              <a:buNone/>
-            </a:pPr>
-            <a:endParaRPr lang="en-US" sz="5100" dirty="0"/>
-          </a:p>
-          <a:p>
-            <a:pPr marL="0" indent="0" algn="ctr">
-              <a:buNone/>
-            </a:pPr>
-            <a:r>
-              <a:rPr lang="en-US" sz="5100" dirty="0"/>
-              <a:t>SAT(Total) = Math (800) + Reading/Writing (800)</a:t>
-            </a:r>
-          </a:p>
-          <a:p>
-            <a:pPr marL="0" indent="0">
-              <a:buNone/>
-            </a:pPr>
-            <a:r>
-              <a:rPr lang="en-US" sz="5100" dirty="0"/>
-              <a:t>	</a:t>
-            </a:r>
-          </a:p>
-          <a:p>
-            <a:pPr marL="0" indent="0" algn="ctr">
-              <a:buNone/>
-            </a:pPr>
-            <a:endParaRPr lang="en-US" sz="5100" b="1" u="sng" dirty="0"/>
-          </a:p>
-          <a:p>
-            <a:pPr marL="0" indent="0" algn="ctr">
-              <a:buNone/>
-            </a:pPr>
-            <a:r>
-              <a:rPr lang="en-US" sz="5100" b="1" u="sng" dirty="0"/>
-              <a:t>ACT</a:t>
-            </a:r>
-          </a:p>
-          <a:p>
-            <a:r>
-              <a:rPr lang="en-US" sz="5100" dirty="0"/>
-              <a:t>Highest Possible Score is a 36</a:t>
-            </a:r>
-          </a:p>
-          <a:p>
-            <a:endParaRPr lang="en-US" sz="5100" dirty="0"/>
-          </a:p>
-          <a:p>
-            <a:pPr marL="0" indent="0" algn="ctr">
-              <a:buNone/>
-            </a:pPr>
-            <a:r>
-              <a:rPr lang="en-US" sz="5100" dirty="0"/>
-              <a:t>ACT (Composite) = </a:t>
-            </a:r>
-          </a:p>
-          <a:p>
-            <a:pPr marL="0" indent="0" algn="ctr">
-              <a:buNone/>
-            </a:pPr>
-            <a:r>
-              <a:rPr lang="en-US" sz="5100" dirty="0"/>
-              <a:t>(Math (36) + Reading (36) + English (36) + Science (36))</a:t>
-            </a:r>
-          </a:p>
-          <a:p>
-            <a:pPr marL="0" indent="0" algn="ctr">
-              <a:buNone/>
-            </a:pPr>
-            <a:r>
-              <a:rPr lang="en-US" sz="5100" dirty="0"/>
-              <a:t>/  4</a:t>
-            </a:r>
-          </a:p>
-          <a:p>
-            <a:pPr marL="0" indent="0">
-              <a:buNone/>
-            </a:pPr>
-            <a:endParaRPr lang="en-US" sz="2600" dirty="0"/>
-          </a:p>
-          <a:p>
-            <a:pPr marL="0" indent="0">
-              <a:buNone/>
-            </a:pPr>
-            <a:r>
-              <a:rPr lang="en-US" dirty="0"/>
-              <a:t> </a:t>
+              <a:t>AP Exams</a:t>
             </a:r>
           </a:p>
         </p:txBody>
@@ -4539,7 +5253,7 @@
           <p:cNvPr id="4" name="Picture 3">
             <a:extLst>
               <a:ext uri="{FF2B5EF4-FFF2-40B4-BE49-F238E27FC236}">
-                <a16:creationId xmlns:a16="http://schemas.microsoft.com/office/drawing/2014/main" id="{3FA2DA13-0A9E-42C3-B28A-73A8FF1591D6}"/>
+                <a16:creationId xmlns:a16="http://schemas.microsoft.com/office/drawing/2014/main" id="{EEBBA21F-F001-429E-BB4C-0B9D92E63A4D}"/>
               </a:ext>
             </a:extLst>
           </p:cNvPr>
@@ -4556,18 +5270,140 @@
         </p:blipFill>
         <p:spPr>
           <a:xfrm>
-            <a:off x="7111014" y="1166142"/>
-            <a:ext cx="5080986" cy="4525715"/>
+            <a:off x="7765001" y="86245"/>
+            <a:ext cx="4426997" cy="3615743"/>
           </a:xfrm>
           <a:prstGeom prst="rect">
             <a:avLst/>
           </a:prstGeom>
         </p:spPr>
       </p:pic>
+      <p:pic>
+        <p:nvPicPr>
+          <p:cNvPr id="5" name="Content Placeholder 4">
+            <a:extLst>
+              <a:ext uri="{FF2B5EF4-FFF2-40B4-BE49-F238E27FC236}">
+                <a16:creationId xmlns:a16="http://schemas.microsoft.com/office/drawing/2014/main" id="{E704507C-16BE-4A10-B6C0-4F7D695DBDF2}"/>
+              </a:ext>
+            </a:extLst>
+          </p:cNvPr>
+          <p:cNvPicPr>
+            <a:picLocks noGrp="1" noChangeAspect="1"/>
+          </p:cNvPicPr>
+          <p:nvPr>
+            <p:ph idx="1"/>
+          </p:nvPr>
+        </p:nvPicPr>
+        <p:blipFill>
+          <a:blip r:embed="rId3"/>
+          <a:stretch>
+            <a:fillRect/>
+          </a:stretch>
+        </p:blipFill>
+        <p:spPr>
+          <a:xfrm>
+            <a:off x="7765002" y="3701988"/>
+            <a:ext cx="4426998" cy="3156012"/>
+          </a:xfrm>
+          <a:prstGeom prst="rect">
+            <a:avLst/>
+          </a:prstGeom>
+        </p:spPr>
+      </p:pic>
+      <p:sp>
+        <p:nvSpPr>
+          <p:cNvPr id="6" name="TextBox 5">
+            <a:extLst>
+              <a:ext uri="{FF2B5EF4-FFF2-40B4-BE49-F238E27FC236}">
+                <a16:creationId xmlns:a16="http://schemas.microsoft.com/office/drawing/2014/main" id="{CD4591B6-94D0-477D-A091-6DDD9A84C394}"/>
+              </a:ext>
+            </a:extLst>
+          </p:cNvPr>
+          <p:cNvSpPr txBox="1"/>
+          <p:nvPr/>
+        </p:nvSpPr>
+        <p:spPr>
+          <a:xfrm>
+            <a:off x="211973" y="589731"/>
+            <a:ext cx="7228604" cy="6955750"/>
+          </a:xfrm>
+          <a:prstGeom prst="rect">
+            <a:avLst/>
+          </a:prstGeom>
+          <a:noFill/>
+        </p:spPr>
+        <p:txBody>
+          <a:bodyPr wrap="square" rtlCol="0">
+            <a:spAutoFit/>
+          </a:bodyPr>
+          <a:lstStyle/>
+          <a:p>
+            <a:pPr algn="ctr"/>
+            <a:r>
+              <a:rPr lang="en-US" sz="2400" b="1" i="1" dirty="0"/>
+              <a:t>At the end of the school year, students enrolled in AP classes have the chance to earn college credit through AP Exams!</a:t>
+            </a:r>
+          </a:p>
+          <a:p>
+            <a:endParaRPr lang="en-US" sz="2000" dirty="0"/>
+          </a:p>
+          <a:p>
+            <a:pPr marL="342900" indent="-342900">
+              <a:buFont typeface="Arial" panose="020B0604020202020204" pitchFamily="34" charset="0"/>
+              <a:buChar char="•"/>
+            </a:pPr>
+            <a:r>
+              <a:rPr lang="en-US" sz="2400" dirty="0"/>
+              <a:t>Most colleges nationwide offer college credit for qualifying AP exam scores. College courses can cost thousands of dollars, but if you take and pass an AP test, you’re only spending roughly $93.  </a:t>
+            </a:r>
+          </a:p>
+          <a:p>
+            <a:pPr marL="342900" indent="-342900" algn="ctr">
+              <a:buFont typeface="Arial" panose="020B0604020202020204" pitchFamily="34" charset="0"/>
+              <a:buChar char="•"/>
+            </a:pPr>
+            <a:endParaRPr lang="en-US" sz="2400" b="1" dirty="0"/>
+          </a:p>
+          <a:p>
+            <a:pPr marL="342900" indent="-342900">
+              <a:buFont typeface="Arial" panose="020B0604020202020204" pitchFamily="34" charset="0"/>
+              <a:buChar char="•"/>
+            </a:pPr>
+            <a:r>
+              <a:rPr lang="en-US" sz="2400" dirty="0"/>
+              <a:t>AP exams are scored from one to five, with five being the highest score. Colleges will accept a minimum exam score for it to transfer to college credit. </a:t>
+            </a:r>
+          </a:p>
+          <a:p>
+            <a:pPr marL="342900" indent="-342900">
+              <a:buFont typeface="Arial" panose="020B0604020202020204" pitchFamily="34" charset="0"/>
+              <a:buChar char="•"/>
+            </a:pPr>
+            <a:endParaRPr lang="en-US" sz="2400" dirty="0"/>
+          </a:p>
+          <a:p>
+            <a:pPr marL="342900" indent="-342900">
+              <a:buFont typeface="Arial" panose="020B0604020202020204" pitchFamily="34" charset="0"/>
+              <a:buChar char="•"/>
+            </a:pPr>
+            <a:r>
+              <a:rPr lang="en-US" sz="2400" dirty="0"/>
+              <a:t>For the purpose of this data analysis, we will use the benchmark score of a 3 (most colleges accept this score) as an indicator of how well students in a district test. </a:t>
+            </a:r>
+          </a:p>
+          <a:p>
+            <a:pPr algn="ctr"/>
+            <a:endParaRPr lang="en-US" sz="2400" b="1" dirty="0"/>
+          </a:p>
+          <a:p>
+            <a:endParaRPr lang="en-US" b="1" dirty="0"/>
+          </a:p>
+        </p:txBody>
+      </p:sp>
     </p:spTree>
     <p:extLst>
       <p:ext uri="{BB962C8B-B14F-4D97-AF65-F5344CB8AC3E}">
-        <p14:creationId xmlns:p14="http://schemas.microsoft.com/office/powerpoint/2010/main" val="2040617450"/>
+        <p14:creationId xmlns:p14="http://schemas.microsoft.com/office/powerpoint/2010/main" val="3093072349"/>
       </p:ext>
     </p:extLst>
   </p:cSld>
@@ -4599,7 +5435,7 @@
           <p:cNvPr id="2" name="Title 1">
             <a:extLst>
               <a:ext uri="{FF2B5EF4-FFF2-40B4-BE49-F238E27FC236}">
-                <a16:creationId xmlns:a16="http://schemas.microsoft.com/office/drawing/2014/main" id="{1CE3BCB5-3A8D-4D52-9BB1-CD52C56B5D7B}"/>
+                <a16:creationId xmlns:a16="http://schemas.microsoft.com/office/drawing/2014/main" id="{611720B1-AAB1-4734-936E-6A7A6276F940}"/>
               </a:ext>
             </a:extLst>
           </p:cNvPr>
@@ -4612,8 +5448,8 @@
         </p:nvSpPr>
         <p:spPr>
           <a:xfrm>
-            <a:off x="71020" y="0"/>
-            <a:ext cx="7510509" cy="679948"/>
+            <a:off x="838200" y="1"/>
+            <a:ext cx="10515600" cy="689810"/>
           </a:xfrm>
         </p:spPr>
         <p:txBody>
@@ -4624,8 +5460,8 @@
           <a:p>
             <a:pPr algn="ctr"/>
             <a:r>
-              <a:rPr lang="en-US" b="1" dirty="0"/>
-              <a:t>AP Exams</a:t>
+              <a:rPr lang="en-US" dirty="0"/>
+              <a:t>Data Analysis: (SAT &amp; ACT)</a:t>
             </a:r>
           </a:p>
         </p:txBody>
@@ -4635,13 +5471,11 @@
           <p:cNvPr id="4" name="Picture 3">
             <a:extLst>
               <a:ext uri="{FF2B5EF4-FFF2-40B4-BE49-F238E27FC236}">
-                <a16:creationId xmlns:a16="http://schemas.microsoft.com/office/drawing/2014/main" id="{EEBBA21F-F001-429E-BB4C-0B9D92E63A4D}"/>
-              </a:ext>
-            </a:extLst>
-          </p:cNvPr>
-          <p:cNvPicPr>
-            <a:picLocks noChangeAspect="1"/>
-          </p:cNvPicPr>
+                <a16:creationId xmlns:a16="http://schemas.microsoft.com/office/drawing/2014/main" id="{527528D7-7935-4581-9A6A-C906F42188CB}"/>
+              </a:ext>
+            </a:extLst>
+          </p:cNvPr>
+          <p:cNvPicPr/>
           <p:nvPr/>
         </p:nvPicPr>
         <p:blipFill>
@@ -4652,8 +5486,8 @@
         </p:blipFill>
         <p:spPr>
           <a:xfrm>
-            <a:off x="7765001" y="86245"/>
-            <a:ext cx="4426997" cy="3615743"/>
+            <a:off x="176462" y="689811"/>
+            <a:ext cx="12015538" cy="3128210"/>
           </a:xfrm>
           <a:prstGeom prst="rect">
             <a:avLst/>
@@ -4662,19 +5496,15 @@
       </p:pic>
       <p:pic>
         <p:nvPicPr>
-          <p:cNvPr id="5" name="Content Placeholder 4">
-            <a:extLst>
-              <a:ext uri="{FF2B5EF4-FFF2-40B4-BE49-F238E27FC236}">
-                <a16:creationId xmlns:a16="http://schemas.microsoft.com/office/drawing/2014/main" id="{E704507C-16BE-4A10-B6C0-4F7D695DBDF2}"/>
-              </a:ext>
-            </a:extLst>
-          </p:cNvPr>
-          <p:cNvPicPr>
-            <a:picLocks noGrp="1" noChangeAspect="1"/>
-          </p:cNvPicPr>
-          <p:nvPr>
-            <p:ph idx="1"/>
-          </p:nvPr>
+          <p:cNvPr id="5" name="Picture 4">
+            <a:extLst>
+              <a:ext uri="{FF2B5EF4-FFF2-40B4-BE49-F238E27FC236}">
+                <a16:creationId xmlns:a16="http://schemas.microsoft.com/office/drawing/2014/main" id="{0F164D4C-BFE3-4631-9432-BB586A478454}"/>
+              </a:ext>
+            </a:extLst>
+          </p:cNvPr>
+          <p:cNvPicPr/>
+          <p:nvPr/>
         </p:nvPicPr>
         <p:blipFill>
           <a:blip r:embed="rId3"/>
@@ -4684,8 +5514,8 @@
         </p:blipFill>
         <p:spPr>
           <a:xfrm>
-            <a:off x="7765002" y="3701988"/>
-            <a:ext cx="4426998" cy="3156012"/>
+            <a:off x="176463" y="3818021"/>
+            <a:ext cx="12015536" cy="3039978"/>
           </a:xfrm>
           <a:prstGeom prst="rect">
             <a:avLst/>
@@ -4694,10 +5524,10 @@
       </p:pic>
       <p:sp>
         <p:nvSpPr>
-          <p:cNvPr id="6" name="TextBox 5">
-            <a:extLst>
-              <a:ext uri="{FF2B5EF4-FFF2-40B4-BE49-F238E27FC236}">
-                <a16:creationId xmlns:a16="http://schemas.microsoft.com/office/drawing/2014/main" id="{CD4591B6-94D0-477D-A091-6DDD9A84C394}"/>
+          <p:cNvPr id="8" name="TextBox 7">
+            <a:extLst>
+              <a:ext uri="{FF2B5EF4-FFF2-40B4-BE49-F238E27FC236}">
+                <a16:creationId xmlns:a16="http://schemas.microsoft.com/office/drawing/2014/main" id="{349BC8DB-8A1B-4878-93F2-27597ABB9182}"/>
               </a:ext>
             </a:extLst>
           </p:cNvPr>
@@ -4706,8 +5536,8 @@
         </p:nvSpPr>
         <p:spPr>
           <a:xfrm>
-            <a:off x="211973" y="589731"/>
-            <a:ext cx="7228604" cy="6955750"/>
+            <a:off x="10395284" y="1138989"/>
+            <a:ext cx="1507958" cy="923330"/>
           </a:xfrm>
           <a:prstGeom prst="rect">
             <a:avLst/>
@@ -4722,70 +5552,66 @@
           <a:p>
             <a:pPr algn="ctr"/>
             <a:r>
-              <a:rPr lang="en-US" sz="2400" b="1" i="1" dirty="0"/>
-              <a:t>At the end of the school year, students enrolled in AP classes have the chance to earn college credit through AP Exams!</a:t>
-            </a:r>
-          </a:p>
-          <a:p>
-            <a:endParaRPr lang="en-US" sz="2000" dirty="0"/>
-          </a:p>
-          <a:p>
-            <a:pPr marL="342900" indent="-342900">
-              <a:buFont typeface="Arial" panose="020B0604020202020204" pitchFamily="34" charset="0"/>
-              <a:buChar char="•"/>
-            </a:pPr>
-            <a:r>
-              <a:rPr lang="en-US" sz="2400" dirty="0"/>
-              <a:t>Most colleges nationwide offer college credit for qualifying AP exam scores. College courses can cost thousands of dollars, but if you take and pass an AP test, you’re only spending roughly $93.  </a:t>
-            </a:r>
-          </a:p>
-          <a:p>
-            <a:pPr marL="342900" indent="-342900" algn="ctr">
-              <a:buFont typeface="Arial" panose="020B0604020202020204" pitchFamily="34" charset="0"/>
-              <a:buChar char="•"/>
-            </a:pPr>
-            <a:endParaRPr lang="en-US" sz="2400" b="1" dirty="0"/>
-          </a:p>
-          <a:p>
-            <a:pPr marL="342900" indent="-342900">
-              <a:buFont typeface="Arial" panose="020B0604020202020204" pitchFamily="34" charset="0"/>
-              <a:buChar char="•"/>
-            </a:pPr>
-            <a:r>
-              <a:rPr lang="en-US" sz="2400" dirty="0"/>
-              <a:t>AP exams are scored from one to five, with five being the highest score. Colleges will accept a minimum exam score for it to transfer to college credit. </a:t>
-            </a:r>
-          </a:p>
-          <a:p>
-            <a:pPr marL="342900" indent="-342900">
-              <a:buFont typeface="Arial" panose="020B0604020202020204" pitchFamily="34" charset="0"/>
-              <a:buChar char="•"/>
-            </a:pPr>
-            <a:endParaRPr lang="en-US" sz="2400" dirty="0"/>
-          </a:p>
-          <a:p>
-            <a:pPr marL="342900" indent="-342900">
-              <a:buFont typeface="Arial" panose="020B0604020202020204" pitchFamily="34" charset="0"/>
-              <a:buChar char="•"/>
-            </a:pPr>
-            <a:r>
-              <a:rPr lang="en-US" sz="2400" dirty="0"/>
-              <a:t>For the purpose of this data analysis, we will use the benchmark score of a 3 (most colleges accept this score) as an indicator of how well students in a district test. </a:t>
+              <a:rPr lang="en-US" dirty="0"/>
+              <a:t>District-Level Mean:</a:t>
             </a:r>
           </a:p>
           <a:p>
             <a:pPr algn="ctr"/>
-            <a:endParaRPr lang="en-US" sz="2400" b="1" dirty="0"/>
-          </a:p>
-          <a:p>
-            <a:endParaRPr lang="en-US" b="1" dirty="0"/>
+            <a:r>
+              <a:rPr lang="en-US" dirty="0"/>
+              <a:t>1052.8</a:t>
+            </a:r>
+          </a:p>
+        </p:txBody>
+      </p:sp>
+      <p:sp>
+        <p:nvSpPr>
+          <p:cNvPr id="9" name="TextBox 8">
+            <a:extLst>
+              <a:ext uri="{FF2B5EF4-FFF2-40B4-BE49-F238E27FC236}">
+                <a16:creationId xmlns:a16="http://schemas.microsoft.com/office/drawing/2014/main" id="{413B47DC-6C6B-47B1-8E10-6AE5CC056BFD}"/>
+              </a:ext>
+            </a:extLst>
+          </p:cNvPr>
+          <p:cNvSpPr txBox="1"/>
+          <p:nvPr/>
+        </p:nvSpPr>
+        <p:spPr>
+          <a:xfrm>
+            <a:off x="10395284" y="4312266"/>
+            <a:ext cx="1507958" cy="923330"/>
+          </a:xfrm>
+          <a:prstGeom prst="rect">
+            <a:avLst/>
+          </a:prstGeom>
+          <a:noFill/>
+        </p:spPr>
+        <p:txBody>
+          <a:bodyPr wrap="square" rtlCol="0">
+            <a:spAutoFit/>
+          </a:bodyPr>
+          <a:lstStyle/>
+          <a:p>
+            <a:pPr algn="ctr"/>
+            <a:r>
+              <a:rPr lang="en-US" dirty="0"/>
+              <a:t>District-Level Mean:</a:t>
+            </a:r>
+          </a:p>
+          <a:p>
+            <a:pPr algn="ctr"/>
+            <a:r>
+              <a:rPr lang="en-US" dirty="0"/>
+              <a:t>21.1</a:t>
+            </a:r>
           </a:p>
         </p:txBody>
       </p:sp>
     </p:spTree>
     <p:extLst>
       <p:ext uri="{BB962C8B-B14F-4D97-AF65-F5344CB8AC3E}">
-        <p14:creationId xmlns:p14="http://schemas.microsoft.com/office/powerpoint/2010/main" val="3093072349"/>
+        <p14:creationId xmlns:p14="http://schemas.microsoft.com/office/powerpoint/2010/main" val="2426884512"/>
       </p:ext>
     </p:extLst>
   </p:cSld>

</xml_diff>